<commit_message>
Updated link to demo video(improved sound quality)
</commit_message>
<xml_diff>
--- a/Documentation/Presentation/Tracktor-Presentation.pptx
+++ b/Documentation/Presentation/Tracktor-Presentation.pptx
@@ -6784,31 +6784,8 @@
                 <a:sym typeface="Droid Serif"/>
                 <a:hlinkClick r:id="rId3"/>
               </a:rPr>
-              <a:t>https://youtu.be/ywYAUtYPsEM</a:t>
-            </a:r>
-          </a:p>
-          <a:p>
-            <a:pPr lvl="0" rtl="0">
-              <a:lnSpc>
-                <a:spcPct val="150000"/>
-              </a:lnSpc>
-              <a:spcBef>
-                <a:spcPts val="1000"/>
-              </a:spcBef>
-              <a:spcAft>
-                <a:spcPts val="0"/>
-              </a:spcAft>
-              <a:buNone/>
-            </a:pPr>
-            <a:r>
-              <a:t/>
-            </a:r>
-            <a:endParaRPr sz="1600">
-              <a:latin typeface="Droid Serif"/>
-              <a:ea typeface="Droid Serif"/>
-              <a:cs typeface="Droid Serif"/>
-              <a:sym typeface="Droid Serif"/>
-            </a:endParaRPr>
+              <a:t>https://www.youtube.com/watch?v=S-oK19eegDg</a:t>
+            </a:r>
           </a:p>
           <a:p>
             <a:pPr lvl="0" rtl="0">

</xml_diff>